<commit_message>
some work on evaluating csp
</commit_message>
<xml_diff>
--- a/poster/poster.pptx
+++ b/poster/poster.pptx
@@ -548,6 +548,34 @@
               <a:rPr lang="en-US" baseline="0" dirty="0" smtClean="0"/>
               <a:t>: neural networks, SVM</a:t>
             </a:r>
+          </a:p>
+          <a:p>
+            <a:endParaRPr lang="en-US" baseline="0" dirty="0" smtClean="0"/>
+          </a:p>
+          <a:p>
+            <a:r>
+              <a:rPr lang="en-US" baseline="0" dirty="0" err="1" smtClean="0"/>
+              <a:t>Neuralnet</a:t>
+            </a:r>
+            <a:r>
+              <a:rPr lang="en-US" baseline="0" dirty="0" smtClean="0"/>
+              <a:t> – 56%</a:t>
+            </a:r>
+          </a:p>
+          <a:p>
+            <a:r>
+              <a:rPr lang="en-US" baseline="0" dirty="0" smtClean="0"/>
+              <a:t>Gaussian – 50.2% (rerun)</a:t>
+            </a:r>
+          </a:p>
+          <a:p>
+            <a:r>
+              <a:rPr lang="en-US" baseline="0" smtClean="0"/>
+              <a:t>Bayesian regression – 51%</a:t>
+            </a:r>
+          </a:p>
+          <a:p>
+            <a:endParaRPr lang="en-US" baseline="0" dirty="0" smtClean="0"/>
           </a:p>
         </p:txBody>
       </p:sp>

</xml_diff>